<commit_message>
some fixes to presentation
</commit_message>
<xml_diff>
--- a/final/Defence.pptx
+++ b/final/Defence.pptx
@@ -1,9 +1,12 @@
 
 <file path=ppt/presentation.xml><?xml version="1.0" encoding="utf-8"?>
-<p:presentation xmlns:a="http://schemas.openxmlformats.org/drawingml/2006/main" xmlns:r="http://schemas.openxmlformats.org/officeDocument/2006/relationships" xmlns:p="http://schemas.openxmlformats.org/presentationml/2006/main" saveSubsetFonts="1">
+<p:presentation xmlns:a="http://schemas.openxmlformats.org/drawingml/2006/main" xmlns:r="http://schemas.openxmlformats.org/officeDocument/2006/relationships" xmlns:p="http://schemas.openxmlformats.org/presentationml/2006/main" showSpecialPlsOnTitleSld="0" saveSubsetFonts="1">
   <p:sldMasterIdLst>
     <p:sldMasterId id="2147483732" r:id="rId1"/>
   </p:sldMasterIdLst>
+  <p:notesMasterIdLst>
+    <p:notesMasterId r:id="rId11"/>
+  </p:notesMasterIdLst>
   <p:sldIdLst>
     <p:sldId id="256" r:id="rId2"/>
     <p:sldId id="257" r:id="rId3"/>
@@ -115,6 +118,440 @@
 </p:presentation>
 </file>
 
+<file path=ppt/notesMasters/notesMaster1.xml><?xml version="1.0" encoding="utf-8"?>
+<p:notesMaster xmlns:a="http://schemas.openxmlformats.org/drawingml/2006/main" xmlns:r="http://schemas.openxmlformats.org/officeDocument/2006/relationships" xmlns:p="http://schemas.openxmlformats.org/presentationml/2006/main">
+  <p:cSld>
+    <p:bg>
+      <p:bgRef idx="1001">
+        <a:schemeClr val="bg1"/>
+      </p:bgRef>
+    </p:bg>
+    <p:spTree>
+      <p:nvGrpSpPr>
+        <p:cNvPr id="1" name=""/>
+        <p:cNvGrpSpPr/>
+        <p:nvPr/>
+      </p:nvGrpSpPr>
+      <p:grpSpPr>
+        <a:xfrm>
+          <a:off x="0" y="0"/>
+          <a:ext cx="0" cy="0"/>
+          <a:chOff x="0" y="0"/>
+          <a:chExt cx="0" cy="0"/>
+        </a:xfrm>
+      </p:grpSpPr>
+      <p:sp>
+        <p:nvSpPr>
+          <p:cNvPr id="2" name="Верхний колонтитул 1"/>
+          <p:cNvSpPr>
+            <a:spLocks noGrp="1"/>
+          </p:cNvSpPr>
+          <p:nvPr>
+            <p:ph type="hdr" sz="quarter"/>
+          </p:nvPr>
+        </p:nvSpPr>
+        <p:spPr>
+          <a:xfrm>
+            <a:off x="0" y="0"/>
+            <a:ext cx="2971800" cy="457200"/>
+          </a:xfrm>
+          <a:prstGeom prst="rect">
+            <a:avLst/>
+          </a:prstGeom>
+        </p:spPr>
+        <p:txBody>
+          <a:bodyPr vert="horz" lIns="91440" tIns="45720" rIns="91440" bIns="45720" rtlCol="0"/>
+          <a:lstStyle>
+            <a:lvl1pPr algn="l">
+              <a:defRPr sz="1200"/>
+            </a:lvl1pPr>
+          </a:lstStyle>
+          <a:p>
+            <a:endParaRPr lang="ru-RU"/>
+          </a:p>
+        </p:txBody>
+      </p:sp>
+      <p:sp>
+        <p:nvSpPr>
+          <p:cNvPr id="3" name="Дата 2"/>
+          <p:cNvSpPr>
+            <a:spLocks noGrp="1"/>
+          </p:cNvSpPr>
+          <p:nvPr>
+            <p:ph type="dt" idx="1"/>
+          </p:nvPr>
+        </p:nvSpPr>
+        <p:spPr>
+          <a:xfrm>
+            <a:off x="3884613" y="0"/>
+            <a:ext cx="2971800" cy="457200"/>
+          </a:xfrm>
+          <a:prstGeom prst="rect">
+            <a:avLst/>
+          </a:prstGeom>
+        </p:spPr>
+        <p:txBody>
+          <a:bodyPr vert="horz" lIns="91440" tIns="45720" rIns="91440" bIns="45720" rtlCol="0"/>
+          <a:lstStyle>
+            <a:lvl1pPr algn="r">
+              <a:defRPr sz="1200"/>
+            </a:lvl1pPr>
+          </a:lstStyle>
+          <a:p>
+            <a:fld id="{0A4A1D80-C757-4B74-99CC-095F89510448}" type="datetimeFigureOut">
+              <a:rPr lang="ru-RU" smtClean="0"/>
+              <a:t>16.05.2013</a:t>
+            </a:fld>
+            <a:endParaRPr lang="ru-RU"/>
+          </a:p>
+        </p:txBody>
+      </p:sp>
+      <p:sp>
+        <p:nvSpPr>
+          <p:cNvPr id="4" name="Образ слайда 3"/>
+          <p:cNvSpPr>
+            <a:spLocks noGrp="1" noRot="1" noChangeAspect="1"/>
+          </p:cNvSpPr>
+          <p:nvPr>
+            <p:ph type="sldImg" idx="2"/>
+          </p:nvPr>
+        </p:nvSpPr>
+        <p:spPr>
+          <a:xfrm>
+            <a:off x="1143000" y="685800"/>
+            <a:ext cx="4572000" cy="3429000"/>
+          </a:xfrm>
+          <a:prstGeom prst="rect">
+            <a:avLst/>
+          </a:prstGeom>
+          <a:noFill/>
+          <a:ln w="12700">
+            <a:solidFill>
+              <a:prstClr val="black"/>
+            </a:solidFill>
+          </a:ln>
+        </p:spPr>
+        <p:txBody>
+          <a:bodyPr vert="horz" lIns="91440" tIns="45720" rIns="91440" bIns="45720" rtlCol="0" anchor="ctr"/>
+          <a:lstStyle/>
+          <a:p>
+            <a:endParaRPr lang="ru-RU"/>
+          </a:p>
+        </p:txBody>
+      </p:sp>
+      <p:sp>
+        <p:nvSpPr>
+          <p:cNvPr id="5" name="Заметки 4"/>
+          <p:cNvSpPr>
+            <a:spLocks noGrp="1"/>
+          </p:cNvSpPr>
+          <p:nvPr>
+            <p:ph type="body" sz="quarter" idx="3"/>
+          </p:nvPr>
+        </p:nvSpPr>
+        <p:spPr>
+          <a:xfrm>
+            <a:off x="685800" y="4343400"/>
+            <a:ext cx="5486400" cy="4114800"/>
+          </a:xfrm>
+          <a:prstGeom prst="rect">
+            <a:avLst/>
+          </a:prstGeom>
+        </p:spPr>
+        <p:txBody>
+          <a:bodyPr vert="horz" lIns="91440" tIns="45720" rIns="91440" bIns="45720" rtlCol="0"/>
+          <a:lstStyle/>
+          <a:p>
+            <a:pPr lvl="0"/>
+            <a:r>
+              <a:rPr lang="ru-RU" smtClean="0"/>
+              <a:t>Образец текста</a:t>
+            </a:r>
+          </a:p>
+          <a:p>
+            <a:pPr lvl="1"/>
+            <a:r>
+              <a:rPr lang="ru-RU" smtClean="0"/>
+              <a:t>Второй уровень</a:t>
+            </a:r>
+          </a:p>
+          <a:p>
+            <a:pPr lvl="2"/>
+            <a:r>
+              <a:rPr lang="ru-RU" smtClean="0"/>
+              <a:t>Третий уровень</a:t>
+            </a:r>
+          </a:p>
+          <a:p>
+            <a:pPr lvl="3"/>
+            <a:r>
+              <a:rPr lang="ru-RU" smtClean="0"/>
+              <a:t>Четвертый уровень</a:t>
+            </a:r>
+          </a:p>
+          <a:p>
+            <a:pPr lvl="4"/>
+            <a:r>
+              <a:rPr lang="ru-RU" smtClean="0"/>
+              <a:t>Пятый уровень</a:t>
+            </a:r>
+            <a:endParaRPr lang="ru-RU"/>
+          </a:p>
+        </p:txBody>
+      </p:sp>
+      <p:sp>
+        <p:nvSpPr>
+          <p:cNvPr id="6" name="Нижний колонтитул 5"/>
+          <p:cNvSpPr>
+            <a:spLocks noGrp="1"/>
+          </p:cNvSpPr>
+          <p:nvPr>
+            <p:ph type="ftr" sz="quarter" idx="4"/>
+          </p:nvPr>
+        </p:nvSpPr>
+        <p:spPr>
+          <a:xfrm>
+            <a:off x="0" y="8685213"/>
+            <a:ext cx="2971800" cy="457200"/>
+          </a:xfrm>
+          <a:prstGeom prst="rect">
+            <a:avLst/>
+          </a:prstGeom>
+        </p:spPr>
+        <p:txBody>
+          <a:bodyPr vert="horz" lIns="91440" tIns="45720" rIns="91440" bIns="45720" rtlCol="0" anchor="b"/>
+          <a:lstStyle>
+            <a:lvl1pPr algn="l">
+              <a:defRPr sz="1200"/>
+            </a:lvl1pPr>
+          </a:lstStyle>
+          <a:p>
+            <a:endParaRPr lang="ru-RU"/>
+          </a:p>
+        </p:txBody>
+      </p:sp>
+      <p:sp>
+        <p:nvSpPr>
+          <p:cNvPr id="7" name="Номер слайда 6"/>
+          <p:cNvSpPr>
+            <a:spLocks noGrp="1"/>
+          </p:cNvSpPr>
+          <p:nvPr>
+            <p:ph type="sldNum" sz="quarter" idx="5"/>
+          </p:nvPr>
+        </p:nvSpPr>
+        <p:spPr>
+          <a:xfrm>
+            <a:off x="3884613" y="8685213"/>
+            <a:ext cx="2971800" cy="457200"/>
+          </a:xfrm>
+          <a:prstGeom prst="rect">
+            <a:avLst/>
+          </a:prstGeom>
+        </p:spPr>
+        <p:txBody>
+          <a:bodyPr vert="horz" lIns="91440" tIns="45720" rIns="91440" bIns="45720" rtlCol="0" anchor="b"/>
+          <a:lstStyle>
+            <a:lvl1pPr algn="r">
+              <a:defRPr sz="1200"/>
+            </a:lvl1pPr>
+          </a:lstStyle>
+          <a:p>
+            <a:fld id="{499F1220-5DA5-44DE-986A-BE4DD46F6E4B}" type="slidenum">
+              <a:rPr lang="ru-RU" smtClean="0"/>
+              <a:t>‹#›</a:t>
+            </a:fld>
+            <a:endParaRPr lang="ru-RU"/>
+          </a:p>
+        </p:txBody>
+      </p:sp>
+    </p:spTree>
+    <p:extLst>
+      <p:ext uri="{BB962C8B-B14F-4D97-AF65-F5344CB8AC3E}">
+        <p14:creationId xmlns:p14="http://schemas.microsoft.com/office/powerpoint/2010/main" val="918005118"/>
+      </p:ext>
+    </p:extLst>
+  </p:cSld>
+  <p:clrMap bg1="lt1" tx1="dk1" bg2="lt2" tx2="dk2" accent1="accent1" accent2="accent2" accent3="accent3" accent4="accent4" accent5="accent5" accent6="accent6" hlink="hlink" folHlink="folHlink"/>
+  <p:notesStyle>
+    <a:lvl1pPr marL="0" algn="l" defTabSz="914400" rtl="0" eaLnBrk="1" latinLnBrk="0" hangingPunct="1">
+      <a:defRPr sz="1200" kern="1200">
+        <a:solidFill>
+          <a:schemeClr val="tx1"/>
+        </a:solidFill>
+        <a:latin typeface="+mn-lt"/>
+        <a:ea typeface="+mn-ea"/>
+        <a:cs typeface="+mn-cs"/>
+      </a:defRPr>
+    </a:lvl1pPr>
+    <a:lvl2pPr marL="457200" algn="l" defTabSz="914400" rtl="0" eaLnBrk="1" latinLnBrk="0" hangingPunct="1">
+      <a:defRPr sz="1200" kern="1200">
+        <a:solidFill>
+          <a:schemeClr val="tx1"/>
+        </a:solidFill>
+        <a:latin typeface="+mn-lt"/>
+        <a:ea typeface="+mn-ea"/>
+        <a:cs typeface="+mn-cs"/>
+      </a:defRPr>
+    </a:lvl2pPr>
+    <a:lvl3pPr marL="914400" algn="l" defTabSz="914400" rtl="0" eaLnBrk="1" latinLnBrk="0" hangingPunct="1">
+      <a:defRPr sz="1200" kern="1200">
+        <a:solidFill>
+          <a:schemeClr val="tx1"/>
+        </a:solidFill>
+        <a:latin typeface="+mn-lt"/>
+        <a:ea typeface="+mn-ea"/>
+        <a:cs typeface="+mn-cs"/>
+      </a:defRPr>
+    </a:lvl3pPr>
+    <a:lvl4pPr marL="1371600" algn="l" defTabSz="914400" rtl="0" eaLnBrk="1" latinLnBrk="0" hangingPunct="1">
+      <a:defRPr sz="1200" kern="1200">
+        <a:solidFill>
+          <a:schemeClr val="tx1"/>
+        </a:solidFill>
+        <a:latin typeface="+mn-lt"/>
+        <a:ea typeface="+mn-ea"/>
+        <a:cs typeface="+mn-cs"/>
+      </a:defRPr>
+    </a:lvl4pPr>
+    <a:lvl5pPr marL="1828800" algn="l" defTabSz="914400" rtl="0" eaLnBrk="1" latinLnBrk="0" hangingPunct="1">
+      <a:defRPr sz="1200" kern="1200">
+        <a:solidFill>
+          <a:schemeClr val="tx1"/>
+        </a:solidFill>
+        <a:latin typeface="+mn-lt"/>
+        <a:ea typeface="+mn-ea"/>
+        <a:cs typeface="+mn-cs"/>
+      </a:defRPr>
+    </a:lvl5pPr>
+    <a:lvl6pPr marL="2286000" algn="l" defTabSz="914400" rtl="0" eaLnBrk="1" latinLnBrk="0" hangingPunct="1">
+      <a:defRPr sz="1200" kern="1200">
+        <a:solidFill>
+          <a:schemeClr val="tx1"/>
+        </a:solidFill>
+        <a:latin typeface="+mn-lt"/>
+        <a:ea typeface="+mn-ea"/>
+        <a:cs typeface="+mn-cs"/>
+      </a:defRPr>
+    </a:lvl6pPr>
+    <a:lvl7pPr marL="2743200" algn="l" defTabSz="914400" rtl="0" eaLnBrk="1" latinLnBrk="0" hangingPunct="1">
+      <a:defRPr sz="1200" kern="1200">
+        <a:solidFill>
+          <a:schemeClr val="tx1"/>
+        </a:solidFill>
+        <a:latin typeface="+mn-lt"/>
+        <a:ea typeface="+mn-ea"/>
+        <a:cs typeface="+mn-cs"/>
+      </a:defRPr>
+    </a:lvl7pPr>
+    <a:lvl8pPr marL="3200400" algn="l" defTabSz="914400" rtl="0" eaLnBrk="1" latinLnBrk="0" hangingPunct="1">
+      <a:defRPr sz="1200" kern="1200">
+        <a:solidFill>
+          <a:schemeClr val="tx1"/>
+        </a:solidFill>
+        <a:latin typeface="+mn-lt"/>
+        <a:ea typeface="+mn-ea"/>
+        <a:cs typeface="+mn-cs"/>
+      </a:defRPr>
+    </a:lvl8pPr>
+    <a:lvl9pPr marL="3657600" algn="l" defTabSz="914400" rtl="0" eaLnBrk="1" latinLnBrk="0" hangingPunct="1">
+      <a:defRPr sz="1200" kern="1200">
+        <a:solidFill>
+          <a:schemeClr val="tx1"/>
+        </a:solidFill>
+        <a:latin typeface="+mn-lt"/>
+        <a:ea typeface="+mn-ea"/>
+        <a:cs typeface="+mn-cs"/>
+      </a:defRPr>
+    </a:lvl9pPr>
+  </p:notesStyle>
+</p:notesMaster>
+</file>
+
+<file path=ppt/notesSlides/notesSlide1.xml><?xml version="1.0" encoding="utf-8"?>
+<p:notes xmlns:a="http://schemas.openxmlformats.org/drawingml/2006/main" xmlns:r="http://schemas.openxmlformats.org/officeDocument/2006/relationships" xmlns:p="http://schemas.openxmlformats.org/presentationml/2006/main">
+  <p:cSld>
+    <p:spTree>
+      <p:nvGrpSpPr>
+        <p:cNvPr id="1" name=""/>
+        <p:cNvGrpSpPr/>
+        <p:nvPr/>
+      </p:nvGrpSpPr>
+      <p:grpSpPr>
+        <a:xfrm>
+          <a:off x="0" y="0"/>
+          <a:ext cx="0" cy="0"/>
+          <a:chOff x="0" y="0"/>
+          <a:chExt cx="0" cy="0"/>
+        </a:xfrm>
+      </p:grpSpPr>
+      <p:sp>
+        <p:nvSpPr>
+          <p:cNvPr id="2" name="Образ слайда 1"/>
+          <p:cNvSpPr>
+            <a:spLocks noGrp="1" noRot="1" noChangeAspect="1"/>
+          </p:cNvSpPr>
+          <p:nvPr>
+            <p:ph type="sldImg"/>
+          </p:nvPr>
+        </p:nvSpPr>
+        <p:spPr/>
+      </p:sp>
+      <p:sp>
+        <p:nvSpPr>
+          <p:cNvPr id="3" name="Заметки 2"/>
+          <p:cNvSpPr>
+            <a:spLocks noGrp="1"/>
+          </p:cNvSpPr>
+          <p:nvPr>
+            <p:ph type="body" idx="1"/>
+          </p:nvPr>
+        </p:nvSpPr>
+        <p:spPr/>
+        <p:txBody>
+          <a:bodyPr/>
+          <a:lstStyle/>
+          <a:p>
+            <a:endParaRPr lang="ru-RU"/>
+          </a:p>
+        </p:txBody>
+      </p:sp>
+      <p:sp>
+        <p:nvSpPr>
+          <p:cNvPr id="4" name="Номер слайда 3"/>
+          <p:cNvSpPr>
+            <a:spLocks noGrp="1"/>
+          </p:cNvSpPr>
+          <p:nvPr>
+            <p:ph type="sldNum" sz="quarter" idx="10"/>
+          </p:nvPr>
+        </p:nvSpPr>
+        <p:spPr/>
+        <p:txBody>
+          <a:bodyPr/>
+          <a:lstStyle/>
+          <a:p>
+            <a:fld id="{499F1220-5DA5-44DE-986A-BE4DD46F6E4B}" type="slidenum">
+              <a:rPr lang="ru-RU" smtClean="0"/>
+              <a:t>2</a:t>
+            </a:fld>
+            <a:endParaRPr lang="ru-RU"/>
+          </a:p>
+        </p:txBody>
+      </p:sp>
+    </p:spTree>
+    <p:extLst>
+      <p:ext uri="{BB962C8B-B14F-4D97-AF65-F5344CB8AC3E}">
+        <p14:creationId xmlns:p14="http://schemas.microsoft.com/office/powerpoint/2010/main" val="1662229941"/>
+      </p:ext>
+    </p:extLst>
+  </p:cSld>
+  <p:clrMapOvr>
+    <a:masterClrMapping/>
+  </p:clrMapOvr>
+</p:notes>
+</file>
+
 <file path=ppt/slideLayouts/slideLayout1.xml><?xml version="1.0" encoding="utf-8"?>
 <p:sldLayout xmlns:a="http://schemas.openxmlformats.org/drawingml/2006/main" xmlns:r="http://schemas.openxmlformats.org/officeDocument/2006/relationships" xmlns:p="http://schemas.openxmlformats.org/presentationml/2006/main" showMasterSp="0" type="title" preserve="1">
   <p:cSld name="Титульный слайд">
@@ -256,7 +693,7 @@
             </a:lvl1pPr>
           </a:lstStyle>
           <a:p>
-            <a:fld id="{B4C71EC6-210F-42DE-9C53-41977AD35B3D}" type="datetimeFigureOut">
+            <a:fld id="{A86E56DE-CEAD-4B07-8223-DA0A78E2DE98}" type="datetime1">
               <a:rPr lang="ru-RU" smtClean="0"/>
               <a:t>16.05.2013</a:t>
             </a:fld>
@@ -615,7 +1052,7 @@
           <a:bodyPr/>
           <a:lstStyle/>
           <a:p>
-            <a:fld id="{B4C71EC6-210F-42DE-9C53-41977AD35B3D}" type="datetimeFigureOut">
+            <a:fld id="{407E0909-4C50-4A8D-BA20-C38BEB4622C9}" type="datetime1">
               <a:rPr lang="ru-RU" smtClean="0"/>
               <a:t>16.05.2013</a:t>
             </a:fld>
@@ -790,7 +1227,7 @@
           <a:bodyPr/>
           <a:lstStyle/>
           <a:p>
-            <a:fld id="{B4C71EC6-210F-42DE-9C53-41977AD35B3D}" type="datetimeFigureOut">
+            <a:fld id="{FD1F2B25-03B3-4F71-A83B-9F9CAA0D0E0B}" type="datetime1">
               <a:rPr lang="ru-RU" smtClean="0"/>
               <a:t>16.05.2013</a:t>
             </a:fld>
@@ -1025,7 +1462,7 @@
           <a:bodyPr/>
           <a:lstStyle/>
           <a:p>
-            <a:fld id="{B4C71EC6-210F-42DE-9C53-41977AD35B3D}" type="datetimeFigureOut">
+            <a:fld id="{7D339974-AD70-46B1-B36D-B31B1C3CA042}" type="datetime1">
               <a:rPr lang="ru-RU" smtClean="0"/>
               <a:t>16.05.2013</a:t>
             </a:fld>
@@ -1294,7 +1731,7 @@
           <a:bodyPr/>
           <a:lstStyle/>
           <a:p>
-            <a:fld id="{B4C71EC6-210F-42DE-9C53-41977AD35B3D}" type="datetimeFigureOut">
+            <a:fld id="{15D84185-1D70-4FF6-8D7E-79923A5976C8}" type="datetime1">
               <a:rPr lang="ru-RU" smtClean="0"/>
               <a:t>16.05.2013</a:t>
             </a:fld>
@@ -1514,7 +1951,7 @@
           <a:bodyPr/>
           <a:lstStyle/>
           <a:p>
-            <a:fld id="{B4C71EC6-210F-42DE-9C53-41977AD35B3D}" type="datetimeFigureOut">
+            <a:fld id="{B44F0479-5F50-49E1-A0D0-F5758BFF84E1}" type="datetime1">
               <a:rPr lang="ru-RU" smtClean="0"/>
               <a:t>16.05.2013</a:t>
             </a:fld>
@@ -1866,7 +2303,7 @@
           <a:bodyPr/>
           <a:lstStyle/>
           <a:p>
-            <a:fld id="{B4C71EC6-210F-42DE-9C53-41977AD35B3D}" type="datetimeFigureOut">
+            <a:fld id="{BDEE6D44-AFE8-4C50-998F-D55EFD1C2796}" type="datetime1">
               <a:rPr lang="ru-RU" smtClean="0"/>
               <a:t>16.05.2013</a:t>
             </a:fld>
@@ -2098,7 +2535,7 @@
           <a:bodyPr/>
           <a:lstStyle/>
           <a:p>
-            <a:fld id="{B4C71EC6-210F-42DE-9C53-41977AD35B3D}" type="datetimeFigureOut">
+            <a:fld id="{70DF1DDD-E051-40C0-97AE-88D911F8BDF3}" type="datetime1">
               <a:rPr lang="ru-RU" smtClean="0"/>
               <a:t>16.05.2013</a:t>
             </a:fld>
@@ -2238,7 +2675,7 @@
           <a:bodyPr/>
           <a:lstStyle/>
           <a:p>
-            <a:fld id="{B4C71EC6-210F-42DE-9C53-41977AD35B3D}" type="datetimeFigureOut">
+            <a:fld id="{29D2216B-7333-4DF2-AB90-D9CACAC6F9C3}" type="datetime1">
               <a:rPr lang="ru-RU" smtClean="0"/>
               <a:t>16.05.2013</a:t>
             </a:fld>
@@ -2515,7 +2952,7 @@
           <a:bodyPr/>
           <a:lstStyle/>
           <a:p>
-            <a:fld id="{B4C71EC6-210F-42DE-9C53-41977AD35B3D}" type="datetimeFigureOut">
+            <a:fld id="{4CACBC87-4D19-46E4-ACB9-42F13B1C12CD}" type="datetime1">
               <a:rPr lang="ru-RU" smtClean="0"/>
               <a:t>16.05.2013</a:t>
             </a:fld>
@@ -2922,7 +3359,7 @@
           <a:bodyPr/>
           <a:lstStyle/>
           <a:p>
-            <a:fld id="{B4C71EC6-210F-42DE-9C53-41977AD35B3D}" type="datetimeFigureOut">
+            <a:fld id="{A1F9A42E-57A3-4917-A083-38CB7B9AF887}" type="datetime1">
               <a:rPr lang="ru-RU" smtClean="0"/>
               <a:t>16.05.2013</a:t>
             </a:fld>
@@ -3260,7 +3697,7 @@
             </a:lvl1pPr>
           </a:lstStyle>
           <a:p>
-            <a:fld id="{B4C71EC6-210F-42DE-9C53-41977AD35B3D}" type="datetimeFigureOut">
+            <a:fld id="{A765A434-9414-4203-8FFA-E5552CF755C7}" type="datetime1">
               <a:rPr lang="ru-RU" smtClean="0"/>
               <a:t>16.05.2013</a:t>
             </a:fld>
@@ -3480,6 +3917,7 @@
     <p:sldLayoutId id="2147483742" r:id="rId10"/>
     <p:sldLayoutId id="2147483743" r:id="rId11"/>
   </p:sldLayoutIdLst>
+  <p:hf hdr="0" ftr="0" dt="0"/>
   <p:txStyles>
     <p:titleStyle>
       <a:lvl1pPr algn="l" rtl="0" eaLnBrk="1" latinLnBrk="0" hangingPunct="1">
@@ -4047,6 +4485,29 @@
           </a:p>
         </p:txBody>
       </p:sp>
+      <p:sp>
+        <p:nvSpPr>
+          <p:cNvPr id="4" name="Номер слайда 3"/>
+          <p:cNvSpPr>
+            <a:spLocks noGrp="1"/>
+          </p:cNvSpPr>
+          <p:nvPr>
+            <p:ph type="sldNum" sz="quarter" idx="12"/>
+          </p:nvPr>
+        </p:nvSpPr>
+        <p:spPr/>
+        <p:txBody>
+          <a:bodyPr/>
+          <a:lstStyle/>
+          <a:p>
+            <a:fld id="{B19B0651-EE4F-4900-A07F-96A6BFA9D0F0}" type="slidenum">
+              <a:rPr lang="ru-RU" smtClean="0"/>
+              <a:t>2</a:t>
+            </a:fld>
+            <a:endParaRPr lang="ru-RU"/>
+          </a:p>
+        </p:txBody>
+      </p:sp>
     </p:spTree>
     <p:extLst>
       <p:ext uri="{BB962C8B-B14F-4D97-AF65-F5344CB8AC3E}">
@@ -4184,6 +4645,29 @@
           </a:extLst>
         </p:spPr>
       </p:pic>
+      <p:sp>
+        <p:nvSpPr>
+          <p:cNvPr id="4" name="Номер слайда 3"/>
+          <p:cNvSpPr>
+            <a:spLocks noGrp="1"/>
+          </p:cNvSpPr>
+          <p:nvPr>
+            <p:ph type="sldNum" sz="quarter" idx="12"/>
+          </p:nvPr>
+        </p:nvSpPr>
+        <p:spPr/>
+        <p:txBody>
+          <a:bodyPr/>
+          <a:lstStyle/>
+          <a:p>
+            <a:fld id="{B19B0651-EE4F-4900-A07F-96A6BFA9D0F0}" type="slidenum">
+              <a:rPr lang="ru-RU" smtClean="0"/>
+              <a:t>3</a:t>
+            </a:fld>
+            <a:endParaRPr lang="ru-RU"/>
+          </a:p>
+        </p:txBody>
+      </p:sp>
     </p:spTree>
     <p:extLst>
       <p:ext uri="{BB962C8B-B14F-4D97-AF65-F5344CB8AC3E}">
@@ -4342,6 +4826,29 @@
           </a:extLst>
         </p:spPr>
       </p:pic>
+      <p:sp>
+        <p:nvSpPr>
+          <p:cNvPr id="4" name="Номер слайда 3"/>
+          <p:cNvSpPr>
+            <a:spLocks noGrp="1"/>
+          </p:cNvSpPr>
+          <p:nvPr>
+            <p:ph type="sldNum" sz="quarter" idx="12"/>
+          </p:nvPr>
+        </p:nvSpPr>
+        <p:spPr/>
+        <p:txBody>
+          <a:bodyPr/>
+          <a:lstStyle/>
+          <a:p>
+            <a:fld id="{B19B0651-EE4F-4900-A07F-96A6BFA9D0F0}" type="slidenum">
+              <a:rPr lang="ru-RU" smtClean="0"/>
+              <a:t>4</a:t>
+            </a:fld>
+            <a:endParaRPr lang="ru-RU"/>
+          </a:p>
+        </p:txBody>
+      </p:sp>
     </p:spTree>
     <p:extLst>
       <p:ext uri="{BB962C8B-B14F-4D97-AF65-F5344CB8AC3E}">
@@ -4643,6 +5150,29 @@
           <a:lstStyle/>
           <a:p>
             <a:pPr algn="ctr"/>
+            <a:endParaRPr lang="ru-RU"/>
+          </a:p>
+        </p:txBody>
+      </p:sp>
+      <p:sp>
+        <p:nvSpPr>
+          <p:cNvPr id="10" name="Номер слайда 9"/>
+          <p:cNvSpPr>
+            <a:spLocks noGrp="1"/>
+          </p:cNvSpPr>
+          <p:nvPr>
+            <p:ph type="sldNum" sz="quarter" idx="12"/>
+          </p:nvPr>
+        </p:nvSpPr>
+        <p:spPr/>
+        <p:txBody>
+          <a:bodyPr/>
+          <a:lstStyle/>
+          <a:p>
+            <a:fld id="{B19B0651-EE4F-4900-A07F-96A6BFA9D0F0}" type="slidenum">
+              <a:rPr lang="ru-RU" smtClean="0"/>
+              <a:t>5</a:t>
+            </a:fld>
             <a:endParaRPr lang="ru-RU"/>
           </a:p>
         </p:txBody>
@@ -4981,6 +5511,29 @@
           </a:extLst>
         </p:spPr>
       </p:pic>
+      <p:sp>
+        <p:nvSpPr>
+          <p:cNvPr id="4" name="Номер слайда 3"/>
+          <p:cNvSpPr>
+            <a:spLocks noGrp="1"/>
+          </p:cNvSpPr>
+          <p:nvPr>
+            <p:ph type="sldNum" sz="quarter" idx="12"/>
+          </p:nvPr>
+        </p:nvSpPr>
+        <p:spPr/>
+        <p:txBody>
+          <a:bodyPr/>
+          <a:lstStyle/>
+          <a:p>
+            <a:fld id="{B19B0651-EE4F-4900-A07F-96A6BFA9D0F0}" type="slidenum">
+              <a:rPr lang="ru-RU" smtClean="0"/>
+              <a:t>6</a:t>
+            </a:fld>
+            <a:endParaRPr lang="ru-RU"/>
+          </a:p>
+        </p:txBody>
+      </p:sp>
     </p:spTree>
     <p:extLst>
       <p:ext uri="{BB962C8B-B14F-4D97-AF65-F5344CB8AC3E}">
@@ -5153,6 +5706,29 @@
           </a:extLst>
         </p:spPr>
       </p:pic>
+      <p:sp>
+        <p:nvSpPr>
+          <p:cNvPr id="4" name="Номер слайда 3"/>
+          <p:cNvSpPr>
+            <a:spLocks noGrp="1"/>
+          </p:cNvSpPr>
+          <p:nvPr>
+            <p:ph type="sldNum" sz="quarter" idx="12"/>
+          </p:nvPr>
+        </p:nvSpPr>
+        <p:spPr/>
+        <p:txBody>
+          <a:bodyPr/>
+          <a:lstStyle/>
+          <a:p>
+            <a:fld id="{B19B0651-EE4F-4900-A07F-96A6BFA9D0F0}" type="slidenum">
+              <a:rPr lang="ru-RU" smtClean="0"/>
+              <a:t>7</a:t>
+            </a:fld>
+            <a:endParaRPr lang="ru-RU"/>
+          </a:p>
+        </p:txBody>
+      </p:sp>
     </p:spTree>
     <p:extLst>
       <p:ext uri="{BB962C8B-B14F-4D97-AF65-F5344CB8AC3E}">
@@ -5732,6 +6308,29 @@
           </p:sp>
         </mc:Fallback>
       </mc:AlternateContent>
+      <p:sp>
+        <p:nvSpPr>
+          <p:cNvPr id="4" name="Номер слайда 3"/>
+          <p:cNvSpPr>
+            <a:spLocks noGrp="1"/>
+          </p:cNvSpPr>
+          <p:nvPr>
+            <p:ph type="sldNum" sz="quarter" idx="12"/>
+          </p:nvPr>
+        </p:nvSpPr>
+        <p:spPr/>
+        <p:txBody>
+          <a:bodyPr/>
+          <a:lstStyle/>
+          <a:p>
+            <a:fld id="{B19B0651-EE4F-4900-A07F-96A6BFA9D0F0}" type="slidenum">
+              <a:rPr lang="ru-RU" smtClean="0"/>
+              <a:t>8</a:t>
+            </a:fld>
+            <a:endParaRPr lang="ru-RU"/>
+          </a:p>
+        </p:txBody>
+      </p:sp>
     </p:spTree>
     <p:extLst>
       <p:ext uri="{BB962C8B-B14F-4D97-AF65-F5344CB8AC3E}">
@@ -5840,6 +6439,29 @@
               <a:t>Вопросы?</a:t>
             </a:r>
             <a:endParaRPr lang="ru-RU" dirty="0"/>
+          </a:p>
+        </p:txBody>
+      </p:sp>
+      <p:sp>
+        <p:nvSpPr>
+          <p:cNvPr id="4" name="Номер слайда 3"/>
+          <p:cNvSpPr>
+            <a:spLocks noGrp="1"/>
+          </p:cNvSpPr>
+          <p:nvPr>
+            <p:ph type="sldNum" sz="quarter" idx="12"/>
+          </p:nvPr>
+        </p:nvSpPr>
+        <p:spPr/>
+        <p:txBody>
+          <a:bodyPr/>
+          <a:lstStyle/>
+          <a:p>
+            <a:fld id="{B19B0651-EE4F-4900-A07F-96A6BFA9D0F0}" type="slidenum">
+              <a:rPr lang="ru-RU" smtClean="0"/>
+              <a:t>9</a:t>
+            </a:fld>
+            <a:endParaRPr lang="ru-RU"/>
           </a:p>
         </p:txBody>
       </p:sp>
@@ -6195,4 +6817,289 @@
   <a:objectDefaults/>
   <a:extraClrSchemeLst/>
 </a:theme>
+</file>
+
+<file path=ppt/theme/theme2.xml><?xml version="1.0" encoding="utf-8"?>
+<a:theme xmlns:a="http://schemas.openxmlformats.org/drawingml/2006/main" name="Тема Office">
+  <a:themeElements>
+    <a:clrScheme name="Стандартная">
+      <a:dk1>
+        <a:sysClr val="windowText" lastClr="000000"/>
+      </a:dk1>
+      <a:lt1>
+        <a:sysClr val="window" lastClr="FFFFFF"/>
+      </a:lt1>
+      <a:dk2>
+        <a:srgbClr val="1F497D"/>
+      </a:dk2>
+      <a:lt2>
+        <a:srgbClr val="EEECE1"/>
+      </a:lt2>
+      <a:accent1>
+        <a:srgbClr val="4F81BD"/>
+      </a:accent1>
+      <a:accent2>
+        <a:srgbClr val="C0504D"/>
+      </a:accent2>
+      <a:accent3>
+        <a:srgbClr val="9BBB59"/>
+      </a:accent3>
+      <a:accent4>
+        <a:srgbClr val="8064A2"/>
+      </a:accent4>
+      <a:accent5>
+        <a:srgbClr val="4BACC6"/>
+      </a:accent5>
+      <a:accent6>
+        <a:srgbClr val="F79646"/>
+      </a:accent6>
+      <a:hlink>
+        <a:srgbClr val="0000FF"/>
+      </a:hlink>
+      <a:folHlink>
+        <a:srgbClr val="800080"/>
+      </a:folHlink>
+    </a:clrScheme>
+    <a:fontScheme name="Стандартная">
+      <a:majorFont>
+        <a:latin typeface="Calibri"/>
+        <a:ea typeface=""/>
+        <a:cs typeface=""/>
+        <a:font script="Jpan" typeface="ＭＳ Ｐゴシック"/>
+        <a:font script="Hang" typeface="맑은 고딕"/>
+        <a:font script="Hans" typeface="宋体"/>
+        <a:font script="Hant" typeface="新細明體"/>
+        <a:font script="Arab" typeface="Times New Roman"/>
+        <a:font script="Hebr" typeface="Times New Roman"/>
+        <a:font script="Thai" typeface="Angsana New"/>
+        <a:font script="Ethi" typeface="Nyala"/>
+        <a:font script="Beng" typeface="Vrinda"/>
+        <a:font script="Gujr" typeface="Shruti"/>
+        <a:font script="Khmr" typeface="MoolBoran"/>
+        <a:font script="Knda" typeface="Tunga"/>
+        <a:font script="Guru" typeface="Raavi"/>
+        <a:font script="Cans" typeface="Euphemia"/>
+        <a:font script="Cher" typeface="Plantagenet Cherokee"/>
+        <a:font script="Yiii" typeface="Microsoft Yi Baiti"/>
+        <a:font script="Tibt" typeface="Microsoft Himalaya"/>
+        <a:font script="Thaa" typeface="MV Boli"/>
+        <a:font script="Deva" typeface="Mangal"/>
+        <a:font script="Telu" typeface="Gautami"/>
+        <a:font script="Taml" typeface="Latha"/>
+        <a:font script="Syrc" typeface="Estrangelo Edessa"/>
+        <a:font script="Orya" typeface="Kalinga"/>
+        <a:font script="Mlym" typeface="Kartika"/>
+        <a:font script="Laoo" typeface="DokChampa"/>
+        <a:font script="Sinh" typeface="Iskoola Pota"/>
+        <a:font script="Mong" typeface="Mongolian Baiti"/>
+        <a:font script="Viet" typeface="Times New Roman"/>
+        <a:font script="Uigh" typeface="Microsoft Uighur"/>
+        <a:font script="Geor" typeface="Sylfaen"/>
+      </a:majorFont>
+      <a:minorFont>
+        <a:latin typeface="Calibri"/>
+        <a:ea typeface=""/>
+        <a:cs typeface=""/>
+        <a:font script="Jpan" typeface="ＭＳ Ｐゴシック"/>
+        <a:font script="Hang" typeface="맑은 고딕"/>
+        <a:font script="Hans" typeface="宋体"/>
+        <a:font script="Hant" typeface="新細明體"/>
+        <a:font script="Arab" typeface="Arial"/>
+        <a:font script="Hebr" typeface="Arial"/>
+        <a:font script="Thai" typeface="Cordia New"/>
+        <a:font script="Ethi" typeface="Nyala"/>
+        <a:font script="Beng" typeface="Vrinda"/>
+        <a:font script="Gujr" typeface="Shruti"/>
+        <a:font script="Khmr" typeface="DaunPenh"/>
+        <a:font script="Knda" typeface="Tunga"/>
+        <a:font script="Guru" typeface="Raavi"/>
+        <a:font script="Cans" typeface="Euphemia"/>
+        <a:font script="Cher" typeface="Plantagenet Cherokee"/>
+        <a:font script="Yiii" typeface="Microsoft Yi Baiti"/>
+        <a:font script="Tibt" typeface="Microsoft Himalaya"/>
+        <a:font script="Thaa" typeface="MV Boli"/>
+        <a:font script="Deva" typeface="Mangal"/>
+        <a:font script="Telu" typeface="Gautami"/>
+        <a:font script="Taml" typeface="Latha"/>
+        <a:font script="Syrc" typeface="Estrangelo Edessa"/>
+        <a:font script="Orya" typeface="Kalinga"/>
+        <a:font script="Mlym" typeface="Kartika"/>
+        <a:font script="Laoo" typeface="DokChampa"/>
+        <a:font script="Sinh" typeface="Iskoola Pota"/>
+        <a:font script="Mong" typeface="Mongolian Baiti"/>
+        <a:font script="Viet" typeface="Arial"/>
+        <a:font script="Uigh" typeface="Microsoft Uighur"/>
+        <a:font script="Geor" typeface="Sylfaen"/>
+      </a:minorFont>
+    </a:fontScheme>
+    <a:fmtScheme name="Стандартная">
+      <a:fillStyleLst>
+        <a:solidFill>
+          <a:schemeClr val="phClr"/>
+        </a:solidFill>
+        <a:gradFill rotWithShape="1">
+          <a:gsLst>
+            <a:gs pos="0">
+              <a:schemeClr val="phClr">
+                <a:tint val="50000"/>
+                <a:satMod val="300000"/>
+              </a:schemeClr>
+            </a:gs>
+            <a:gs pos="35000">
+              <a:schemeClr val="phClr">
+                <a:tint val="37000"/>
+                <a:satMod val="300000"/>
+              </a:schemeClr>
+            </a:gs>
+            <a:gs pos="100000">
+              <a:schemeClr val="phClr">
+                <a:tint val="15000"/>
+                <a:satMod val="350000"/>
+              </a:schemeClr>
+            </a:gs>
+          </a:gsLst>
+          <a:lin ang="16200000" scaled="1"/>
+        </a:gradFill>
+        <a:gradFill rotWithShape="1">
+          <a:gsLst>
+            <a:gs pos="0">
+              <a:schemeClr val="phClr">
+                <a:shade val="51000"/>
+                <a:satMod val="130000"/>
+              </a:schemeClr>
+            </a:gs>
+            <a:gs pos="80000">
+              <a:schemeClr val="phClr">
+                <a:shade val="93000"/>
+                <a:satMod val="130000"/>
+              </a:schemeClr>
+            </a:gs>
+            <a:gs pos="100000">
+              <a:schemeClr val="phClr">
+                <a:shade val="94000"/>
+                <a:satMod val="135000"/>
+              </a:schemeClr>
+            </a:gs>
+          </a:gsLst>
+          <a:lin ang="16200000" scaled="0"/>
+        </a:gradFill>
+      </a:fillStyleLst>
+      <a:lnStyleLst>
+        <a:ln w="9525" cap="flat" cmpd="sng" algn="ctr">
+          <a:solidFill>
+            <a:schemeClr val="phClr">
+              <a:shade val="95000"/>
+              <a:satMod val="105000"/>
+            </a:schemeClr>
+          </a:solidFill>
+          <a:prstDash val="solid"/>
+        </a:ln>
+        <a:ln w="25400" cap="flat" cmpd="sng" algn="ctr">
+          <a:solidFill>
+            <a:schemeClr val="phClr"/>
+          </a:solidFill>
+          <a:prstDash val="solid"/>
+        </a:ln>
+        <a:ln w="38100" cap="flat" cmpd="sng" algn="ctr">
+          <a:solidFill>
+            <a:schemeClr val="phClr"/>
+          </a:solidFill>
+          <a:prstDash val="solid"/>
+        </a:ln>
+      </a:lnStyleLst>
+      <a:effectStyleLst>
+        <a:effectStyle>
+          <a:effectLst>
+            <a:outerShdw blurRad="40000" dist="20000" dir="5400000" rotWithShape="0">
+              <a:srgbClr val="000000">
+                <a:alpha val="38000"/>
+              </a:srgbClr>
+            </a:outerShdw>
+          </a:effectLst>
+        </a:effectStyle>
+        <a:effectStyle>
+          <a:effectLst>
+            <a:outerShdw blurRad="40000" dist="23000" dir="5400000" rotWithShape="0">
+              <a:srgbClr val="000000">
+                <a:alpha val="35000"/>
+              </a:srgbClr>
+            </a:outerShdw>
+          </a:effectLst>
+        </a:effectStyle>
+        <a:effectStyle>
+          <a:effectLst>
+            <a:outerShdw blurRad="40000" dist="23000" dir="5400000" rotWithShape="0">
+              <a:srgbClr val="000000">
+                <a:alpha val="35000"/>
+              </a:srgbClr>
+            </a:outerShdw>
+          </a:effectLst>
+          <a:scene3d>
+            <a:camera prst="orthographicFront">
+              <a:rot lat="0" lon="0" rev="0"/>
+            </a:camera>
+            <a:lightRig rig="threePt" dir="t">
+              <a:rot lat="0" lon="0" rev="1200000"/>
+            </a:lightRig>
+          </a:scene3d>
+          <a:sp3d>
+            <a:bevelT w="63500" h="25400"/>
+          </a:sp3d>
+        </a:effectStyle>
+      </a:effectStyleLst>
+      <a:bgFillStyleLst>
+        <a:solidFill>
+          <a:schemeClr val="phClr"/>
+        </a:solidFill>
+        <a:gradFill rotWithShape="1">
+          <a:gsLst>
+            <a:gs pos="0">
+              <a:schemeClr val="phClr">
+                <a:tint val="40000"/>
+                <a:satMod val="350000"/>
+              </a:schemeClr>
+            </a:gs>
+            <a:gs pos="40000">
+              <a:schemeClr val="phClr">
+                <a:tint val="45000"/>
+                <a:shade val="99000"/>
+                <a:satMod val="350000"/>
+              </a:schemeClr>
+            </a:gs>
+            <a:gs pos="100000">
+              <a:schemeClr val="phClr">
+                <a:shade val="20000"/>
+                <a:satMod val="255000"/>
+              </a:schemeClr>
+            </a:gs>
+          </a:gsLst>
+          <a:path path="circle">
+            <a:fillToRect l="50000" t="-80000" r="50000" b="180000"/>
+          </a:path>
+        </a:gradFill>
+        <a:gradFill rotWithShape="1">
+          <a:gsLst>
+            <a:gs pos="0">
+              <a:schemeClr val="phClr">
+                <a:tint val="80000"/>
+                <a:satMod val="300000"/>
+              </a:schemeClr>
+            </a:gs>
+            <a:gs pos="100000">
+              <a:schemeClr val="phClr">
+                <a:shade val="30000"/>
+                <a:satMod val="200000"/>
+              </a:schemeClr>
+            </a:gs>
+          </a:gsLst>
+          <a:path path="circle">
+            <a:fillToRect l="50000" t="50000" r="50000" b="50000"/>
+          </a:path>
+        </a:gradFill>
+      </a:bgFillStyleLst>
+    </a:fmtScheme>
+  </a:themeElements>
+  <a:objectDefaults/>
+  <a:extraClrSchemeLst/>
+</a:theme>
 </file>
</xml_diff>